<commit_message>
28May Second commit28May Second commit28May Second commit28May Second commit28May Second commit28May Second commit28May Second commit28May Second commit28May Second commit28May Second commit28May Second commit28May Second commit28May Second commit28May Second commit28May Second commit28May Second commit28May Second commit28May Second commit28May Second commit28May Second commit28May Second commit28May Second commit28May Second commit28May Second commit28May Second commit28May Second commit28May Second commit28May Second commit
</commit_message>
<xml_diff>
--- a/Python.pptx
+++ b/Python.pptx
@@ -7,6 +7,7 @@
   <p:sldIdLst>
     <p:sldId id="256" r:id="rId2"/>
     <p:sldId id="257" r:id="rId3"/>
+    <p:sldId id="258" r:id="rId4"/>
   </p:sldIdLst>
   <p:sldSz cx="12192000" cy="6858000"/>
   <p:notesSz cx="6858000" cy="9144000"/>
@@ -105,6 +106,11 @@
       </a:defRPr>
     </a:lvl9pPr>
   </p:defaultTextStyle>
+  <p:extLst>
+    <p:ext uri="{EFAFB233-063F-42B5-8137-9DF3F51BA10A}">
+      <p15:sldGuideLst xmlns:p15="http://schemas.microsoft.com/office/powerpoint/2012/main"/>
+    </p:ext>
+  </p:extLst>
 </p:presentation>
 </file>
 
@@ -259,7 +265,7 @@
           <a:p>
             <a:fld id="{489BBDF3-AD16-4D86-A3BC-AAB36FE465C3}" type="datetimeFigureOut">
               <a:rPr lang="en-US" smtClean="0"/>
-              <a:t>5/8/2018</a:t>
+              <a:t>5/28/2018</a:t>
             </a:fld>
             <a:endParaRPr lang="en-US"/>
           </a:p>
@@ -457,7 +463,7 @@
           <a:p>
             <a:fld id="{489BBDF3-AD16-4D86-A3BC-AAB36FE465C3}" type="datetimeFigureOut">
               <a:rPr lang="en-US" smtClean="0"/>
-              <a:t>5/8/2018</a:t>
+              <a:t>5/28/2018</a:t>
             </a:fld>
             <a:endParaRPr lang="en-US"/>
           </a:p>
@@ -665,7 +671,7 @@
           <a:p>
             <a:fld id="{489BBDF3-AD16-4D86-A3BC-AAB36FE465C3}" type="datetimeFigureOut">
               <a:rPr lang="en-US" smtClean="0"/>
-              <a:t>5/8/2018</a:t>
+              <a:t>5/28/2018</a:t>
             </a:fld>
             <a:endParaRPr lang="en-US"/>
           </a:p>
@@ -863,7 +869,7 @@
           <a:p>
             <a:fld id="{489BBDF3-AD16-4D86-A3BC-AAB36FE465C3}" type="datetimeFigureOut">
               <a:rPr lang="en-US" smtClean="0"/>
-              <a:t>5/8/2018</a:t>
+              <a:t>5/28/2018</a:t>
             </a:fld>
             <a:endParaRPr lang="en-US"/>
           </a:p>
@@ -1138,7 +1144,7 @@
           <a:p>
             <a:fld id="{489BBDF3-AD16-4D86-A3BC-AAB36FE465C3}" type="datetimeFigureOut">
               <a:rPr lang="en-US" smtClean="0"/>
-              <a:t>5/8/2018</a:t>
+              <a:t>5/28/2018</a:t>
             </a:fld>
             <a:endParaRPr lang="en-US"/>
           </a:p>
@@ -1403,7 +1409,7 @@
           <a:p>
             <a:fld id="{489BBDF3-AD16-4D86-A3BC-AAB36FE465C3}" type="datetimeFigureOut">
               <a:rPr lang="en-US" smtClean="0"/>
-              <a:t>5/8/2018</a:t>
+              <a:t>5/28/2018</a:t>
             </a:fld>
             <a:endParaRPr lang="en-US"/>
           </a:p>
@@ -1815,7 +1821,7 @@
           <a:p>
             <a:fld id="{489BBDF3-AD16-4D86-A3BC-AAB36FE465C3}" type="datetimeFigureOut">
               <a:rPr lang="en-US" smtClean="0"/>
-              <a:t>5/8/2018</a:t>
+              <a:t>5/28/2018</a:t>
             </a:fld>
             <a:endParaRPr lang="en-US"/>
           </a:p>
@@ -1956,7 +1962,7 @@
           <a:p>
             <a:fld id="{489BBDF3-AD16-4D86-A3BC-AAB36FE465C3}" type="datetimeFigureOut">
               <a:rPr lang="en-US" smtClean="0"/>
-              <a:t>5/8/2018</a:t>
+              <a:t>5/28/2018</a:t>
             </a:fld>
             <a:endParaRPr lang="en-US"/>
           </a:p>
@@ -2069,7 +2075,7 @@
           <a:p>
             <a:fld id="{489BBDF3-AD16-4D86-A3BC-AAB36FE465C3}" type="datetimeFigureOut">
               <a:rPr lang="en-US" smtClean="0"/>
-              <a:t>5/8/2018</a:t>
+              <a:t>5/28/2018</a:t>
             </a:fld>
             <a:endParaRPr lang="en-US"/>
           </a:p>
@@ -2380,7 +2386,7 @@
           <a:p>
             <a:fld id="{489BBDF3-AD16-4D86-A3BC-AAB36FE465C3}" type="datetimeFigureOut">
               <a:rPr lang="en-US" smtClean="0"/>
-              <a:t>5/8/2018</a:t>
+              <a:t>5/28/2018</a:t>
             </a:fld>
             <a:endParaRPr lang="en-US"/>
           </a:p>
@@ -2668,7 +2674,7 @@
           <a:p>
             <a:fld id="{489BBDF3-AD16-4D86-A3BC-AAB36FE465C3}" type="datetimeFigureOut">
               <a:rPr lang="en-US" smtClean="0"/>
-              <a:t>5/8/2018</a:t>
+              <a:t>5/28/2018</a:t>
             </a:fld>
             <a:endParaRPr lang="en-US"/>
           </a:p>
@@ -2909,7 +2915,7 @@
           <a:p>
             <a:fld id="{489BBDF3-AD16-4D86-A3BC-AAB36FE465C3}" type="datetimeFigureOut">
               <a:rPr lang="en-US" smtClean="0"/>
-              <a:t>5/8/2018</a:t>
+              <a:t>5/28/2018</a:t>
             </a:fld>
             <a:endParaRPr lang="en-US"/>
           </a:p>
@@ -3518,6 +3524,20 @@
             <a:pPr marL="0" indent="0">
               <a:buNone/>
             </a:pPr>
+            <a:r>
+              <a:rPr lang="en-US" sz="1500" dirty="0"/>
+              <a:t>This is </a:t>
+            </a:r>
+            <a:r>
+              <a:rPr lang="en-US" sz="1500"/>
+              <a:t>new line</a:t>
+            </a:r>
+            <a:endParaRPr lang="en-US" sz="1500" dirty="0"/>
+          </a:p>
+          <a:p>
+            <a:pPr marL="0" indent="0">
+              <a:buNone/>
+            </a:pPr>
             <a:endParaRPr lang="en-US" sz="1500" dirty="0"/>
           </a:p>
         </p:txBody>
@@ -3526,6 +3546,86 @@
     <p:extLst>
       <p:ext uri="{BB962C8B-B14F-4D97-AF65-F5344CB8AC3E}">
         <p14:creationId xmlns:p14="http://schemas.microsoft.com/office/powerpoint/2010/main" val="1262511513"/>
+      </p:ext>
+    </p:extLst>
+  </p:cSld>
+  <p:clrMapOvr>
+    <a:masterClrMapping/>
+  </p:clrMapOvr>
+</p:sld>
+</file>
+
+<file path=ppt/slides/slide3.xml><?xml version="1.0" encoding="utf-8"?>
+<p:sld xmlns:a="http://schemas.openxmlformats.org/drawingml/2006/main" xmlns:r="http://schemas.openxmlformats.org/officeDocument/2006/relationships" xmlns:p="http://schemas.openxmlformats.org/presentationml/2006/main">
+  <p:cSld>
+    <p:spTree>
+      <p:nvGrpSpPr>
+        <p:cNvPr id="1" name=""/>
+        <p:cNvGrpSpPr/>
+        <p:nvPr/>
+      </p:nvGrpSpPr>
+      <p:grpSpPr>
+        <a:xfrm>
+          <a:off x="0" y="0"/>
+          <a:ext cx="0" cy="0"/>
+          <a:chOff x="0" y="0"/>
+          <a:chExt cx="0" cy="0"/>
+        </a:xfrm>
+      </p:grpSpPr>
+      <p:sp>
+        <p:nvSpPr>
+          <p:cNvPr id="2" name="Title 1">
+            <a:extLst>
+              <a:ext uri="{FF2B5EF4-FFF2-40B4-BE49-F238E27FC236}">
+                <a16:creationId xmlns:a16="http://schemas.microsoft.com/office/drawing/2014/main" id="{F3F7372C-218C-4459-9E3F-16AF77A9811C}"/>
+              </a:ext>
+            </a:extLst>
+          </p:cNvPr>
+          <p:cNvSpPr>
+            <a:spLocks noGrp="1"/>
+          </p:cNvSpPr>
+          <p:nvPr>
+            <p:ph type="title"/>
+          </p:nvPr>
+        </p:nvSpPr>
+        <p:spPr/>
+        <p:txBody>
+          <a:bodyPr/>
+          <a:lstStyle/>
+          <a:p>
+            <a:endParaRPr lang="en-US"/>
+          </a:p>
+        </p:txBody>
+      </p:sp>
+      <p:sp>
+        <p:nvSpPr>
+          <p:cNvPr id="3" name="Content Placeholder 2">
+            <a:extLst>
+              <a:ext uri="{FF2B5EF4-FFF2-40B4-BE49-F238E27FC236}">
+                <a16:creationId xmlns:a16="http://schemas.microsoft.com/office/drawing/2014/main" id="{A4B06B15-19C4-44B9-8A9C-CE7DEF488E60}"/>
+              </a:ext>
+            </a:extLst>
+          </p:cNvPr>
+          <p:cNvSpPr>
+            <a:spLocks noGrp="1"/>
+          </p:cNvSpPr>
+          <p:nvPr>
+            <p:ph idx="1"/>
+          </p:nvPr>
+        </p:nvSpPr>
+        <p:spPr/>
+        <p:txBody>
+          <a:bodyPr/>
+          <a:lstStyle/>
+          <a:p>
+            <a:endParaRPr lang="en-US"/>
+          </a:p>
+        </p:txBody>
+      </p:sp>
+    </p:spTree>
+    <p:extLst>
+      <p:ext uri="{BB962C8B-B14F-4D97-AF65-F5344CB8AC3E}">
+        <p14:creationId xmlns:p14="http://schemas.microsoft.com/office/powerpoint/2010/main" val="2093513123"/>
       </p:ext>
     </p:extLst>
   </p:cSld>

</xml_diff>